<commit_message>
Added shorthand math ops and incr/decr predictions
</commit_message>
<xml_diff>
--- a/Weekly Updates/Final Presentation/CASP Final.pptx
+++ b/Weekly Updates/Final Presentation/CASP Final.pptx
@@ -12,14 +12,12 @@
     <p:sldId id="259" r:id="rId6"/>
     <p:sldId id="260" r:id="rId7"/>
     <p:sldId id="262" r:id="rId8"/>
-    <p:sldId id="263" r:id="rId9"/>
-    <p:sldId id="264" r:id="rId10"/>
-    <p:sldId id="265" r:id="rId11"/>
-    <p:sldId id="266" r:id="rId12"/>
-    <p:sldId id="267" r:id="rId13"/>
-    <p:sldId id="268" r:id="rId14"/>
-    <p:sldId id="269" r:id="rId15"/>
-    <p:sldId id="270" r:id="rId16"/>
+    <p:sldId id="264" r:id="rId9"/>
+    <p:sldId id="265" r:id="rId10"/>
+    <p:sldId id="266" r:id="rId11"/>
+    <p:sldId id="267" r:id="rId12"/>
+    <p:sldId id="268" r:id="rId13"/>
+    <p:sldId id="270" r:id="rId14"/>
   </p:sldIdLst>
   <p:sldSz cx="12192000" cy="6858000"/>
   <p:notesSz cx="6858000" cy="9144000"/>
@@ -296,7 +294,7 @@
           <a:p>
             <a:fld id="{E6C36A7E-1B23-46D3-B97D-FBE591A5B164}" type="datetimeFigureOut">
               <a:rPr lang="en-US" smtClean="0"/>
-              <a:t>4/19/2017</a:t>
+              <a:t>4/24/2017</a:t>
             </a:fld>
             <a:endParaRPr lang="en-US"/>
           </a:p>
@@ -563,7 +561,7 @@
           <a:p>
             <a:fld id="{E6C36A7E-1B23-46D3-B97D-FBE591A5B164}" type="datetimeFigureOut">
               <a:rPr lang="en-US" smtClean="0"/>
-              <a:t>4/19/2017</a:t>
+              <a:t>4/24/2017</a:t>
             </a:fld>
             <a:endParaRPr lang="en-US"/>
           </a:p>
@@ -794,7 +792,7 @@
           <a:p>
             <a:fld id="{E6C36A7E-1B23-46D3-B97D-FBE591A5B164}" type="datetimeFigureOut">
               <a:rPr lang="en-US" smtClean="0"/>
-              <a:t>4/19/2017</a:t>
+              <a:t>4/24/2017</a:t>
             </a:fld>
             <a:endParaRPr lang="en-US"/>
           </a:p>
@@ -1104,7 +1102,7 @@
           <a:p>
             <a:fld id="{E6C36A7E-1B23-46D3-B97D-FBE591A5B164}" type="datetimeFigureOut">
               <a:rPr lang="en-US" smtClean="0"/>
-              <a:t>4/19/2017</a:t>
+              <a:t>4/24/2017</a:t>
             </a:fld>
             <a:endParaRPr lang="en-US"/>
           </a:p>
@@ -1577,7 +1575,7 @@
           <a:p>
             <a:fld id="{E6C36A7E-1B23-46D3-B97D-FBE591A5B164}" type="datetimeFigureOut">
               <a:rPr lang="en-US" smtClean="0"/>
-              <a:t>4/19/2017</a:t>
+              <a:t>4/24/2017</a:t>
             </a:fld>
             <a:endParaRPr lang="en-US"/>
           </a:p>
@@ -2124,7 +2122,7 @@
           <a:p>
             <a:fld id="{E6C36A7E-1B23-46D3-B97D-FBE591A5B164}" type="datetimeFigureOut">
               <a:rPr lang="en-US" smtClean="0"/>
-              <a:t>4/19/2017</a:t>
+              <a:t>4/24/2017</a:t>
             </a:fld>
             <a:endParaRPr lang="en-US"/>
           </a:p>
@@ -2898,7 +2896,7 @@
           <a:p>
             <a:fld id="{E6C36A7E-1B23-46D3-B97D-FBE591A5B164}" type="datetimeFigureOut">
               <a:rPr lang="en-US" smtClean="0"/>
-              <a:t>4/19/2017</a:t>
+              <a:t>4/24/2017</a:t>
             </a:fld>
             <a:endParaRPr lang="en-US"/>
           </a:p>
@@ -3073,7 +3071,7 @@
           <a:p>
             <a:fld id="{E6C36A7E-1B23-46D3-B97D-FBE591A5B164}" type="datetimeFigureOut">
               <a:rPr lang="en-US" smtClean="0"/>
-              <a:t>4/19/2017</a:t>
+              <a:t>4/24/2017</a:t>
             </a:fld>
             <a:endParaRPr lang="en-US"/>
           </a:p>
@@ -3296,7 +3294,7 @@
           <a:p>
             <a:fld id="{E6C36A7E-1B23-46D3-B97D-FBE591A5B164}" type="datetimeFigureOut">
               <a:rPr lang="en-US" smtClean="0"/>
-              <a:t>4/19/2017</a:t>
+              <a:t>4/24/2017</a:t>
             </a:fld>
             <a:endParaRPr lang="en-US"/>
           </a:p>
@@ -3476,7 +3474,7 @@
           <a:p>
             <a:fld id="{E6C36A7E-1B23-46D3-B97D-FBE591A5B164}" type="datetimeFigureOut">
               <a:rPr lang="en-US" smtClean="0"/>
-              <a:t>4/19/2017</a:t>
+              <a:t>4/24/2017</a:t>
             </a:fld>
             <a:endParaRPr lang="en-US"/>
           </a:p>
@@ -3765,7 +3763,7 @@
           <a:p>
             <a:fld id="{E6C36A7E-1B23-46D3-B97D-FBE591A5B164}" type="datetimeFigureOut">
               <a:rPr lang="en-US" smtClean="0"/>
-              <a:t>4/19/2017</a:t>
+              <a:t>4/24/2017</a:t>
             </a:fld>
             <a:endParaRPr lang="en-US"/>
           </a:p>
@@ -4007,7 +4005,7 @@
           <a:p>
             <a:fld id="{E6C36A7E-1B23-46D3-B97D-FBE591A5B164}" type="datetimeFigureOut">
               <a:rPr lang="en-US" smtClean="0"/>
-              <a:t>4/19/2017</a:t>
+              <a:t>4/24/2017</a:t>
             </a:fld>
             <a:endParaRPr lang="en-US"/>
           </a:p>
@@ -4386,7 +4384,7 @@
           <a:p>
             <a:fld id="{E6C36A7E-1B23-46D3-B97D-FBE591A5B164}" type="datetimeFigureOut">
               <a:rPr lang="en-US" smtClean="0"/>
-              <a:t>4/19/2017</a:t>
+              <a:t>4/24/2017</a:t>
             </a:fld>
             <a:endParaRPr lang="en-US"/>
           </a:p>
@@ -4504,7 +4502,7 @@
           <a:p>
             <a:fld id="{E6C36A7E-1B23-46D3-B97D-FBE591A5B164}" type="datetimeFigureOut">
               <a:rPr lang="en-US" smtClean="0"/>
-              <a:t>4/19/2017</a:t>
+              <a:t>4/24/2017</a:t>
             </a:fld>
             <a:endParaRPr lang="en-US"/>
           </a:p>
@@ -4599,7 +4597,7 @@
           <a:p>
             <a:fld id="{E6C36A7E-1B23-46D3-B97D-FBE591A5B164}" type="datetimeFigureOut">
               <a:rPr lang="en-US" smtClean="0"/>
-              <a:t>4/19/2017</a:t>
+              <a:t>4/24/2017</a:t>
             </a:fld>
             <a:endParaRPr lang="en-US"/>
           </a:p>
@@ -4848,7 +4846,7 @@
           <a:p>
             <a:fld id="{E6C36A7E-1B23-46D3-B97D-FBE591A5B164}" type="datetimeFigureOut">
               <a:rPr lang="en-US" smtClean="0"/>
-              <a:t>4/19/2017</a:t>
+              <a:t>4/24/2017</a:t>
             </a:fld>
             <a:endParaRPr lang="en-US"/>
           </a:p>
@@ -5105,7 +5103,7 @@
           <a:p>
             <a:fld id="{E6C36A7E-1B23-46D3-B97D-FBE591A5B164}" type="datetimeFigureOut">
               <a:rPr lang="en-US" smtClean="0"/>
-              <a:t>4/19/2017</a:t>
+              <a:t>4/24/2017</a:t>
             </a:fld>
             <a:endParaRPr lang="en-US"/>
           </a:p>
@@ -5348,7 +5346,7 @@
           <a:p>
             <a:fld id="{E6C36A7E-1B23-46D3-B97D-FBE591A5B164}" type="datetimeFigureOut">
               <a:rPr lang="en-US" smtClean="0"/>
-              <a:t>4/19/2017</a:t>
+              <a:t>4/24/2017</a:t>
             </a:fld>
             <a:endParaRPr lang="en-US"/>
           </a:p>
@@ -5878,7 +5876,7 @@
           <a:p>
             <a:r>
               <a:rPr lang="en-US" dirty="0"/>
-              <a:t>Control Module</a:t>
+              <a:t>Outline Module</a:t>
             </a:r>
           </a:p>
         </p:txBody>
@@ -5900,21 +5898,18 @@
           <a:p>
             <a:r>
               <a:rPr lang="en-US" dirty="0"/>
-              <a:t>How important this one is!</a:t>
-            </a:r>
-          </a:p>
-          <a:p>
-            <a:r>
-              <a:rPr lang="en-US" dirty="0"/>
-              <a:t>The only module necessary to program operation (not program computation, though!)</a:t>
-            </a:r>
+              <a:t>Simple examples for each</a:t>
+            </a:r>
+          </a:p>
+          <a:p>
+            <a:endParaRPr lang="en-US" dirty="0"/>
           </a:p>
         </p:txBody>
       </p:sp>
     </p:spTree>
     <p:extLst>
       <p:ext uri="{BB962C8B-B14F-4D97-AF65-F5344CB8AC3E}">
-        <p14:creationId xmlns:p14="http://schemas.microsoft.com/office/powerpoint/2010/main" val="3648450403"/>
+        <p14:creationId xmlns:p14="http://schemas.microsoft.com/office/powerpoint/2010/main" val="1764804817"/>
       </p:ext>
     </p:extLst>
   </p:cSld>
@@ -5958,7 +5953,7 @@
           <a:p>
             <a:r>
               <a:rPr lang="en-US" dirty="0"/>
-              <a:t>Outline Module</a:t>
+              <a:t>Translate Module</a:t>
             </a:r>
           </a:p>
         </p:txBody>
@@ -5978,14 +5973,14 @@
           <a:bodyPr/>
           <a:lstStyle/>
           <a:p>
-            <a:endParaRPr lang="en-US"/>
+            <a:endParaRPr lang="en-US" dirty="0"/>
           </a:p>
         </p:txBody>
       </p:sp>
     </p:spTree>
     <p:extLst>
       <p:ext uri="{BB962C8B-B14F-4D97-AF65-F5344CB8AC3E}">
-        <p14:creationId xmlns:p14="http://schemas.microsoft.com/office/powerpoint/2010/main" val="1764804817"/>
+        <p14:creationId xmlns:p14="http://schemas.microsoft.com/office/powerpoint/2010/main" val="109806161"/>
       </p:ext>
     </p:extLst>
   </p:cSld>
@@ -6029,7 +6024,7 @@
           <a:p>
             <a:r>
               <a:rPr lang="en-US" dirty="0"/>
-              <a:t>Translate Module</a:t>
+              <a:t>Analyze Module</a:t>
             </a:r>
           </a:p>
         </p:txBody>
@@ -6056,7 +6051,7 @@
     </p:spTree>
     <p:extLst>
       <p:ext uri="{BB962C8B-B14F-4D97-AF65-F5344CB8AC3E}">
-        <p14:creationId xmlns:p14="http://schemas.microsoft.com/office/powerpoint/2010/main" val="109806161"/>
+        <p14:creationId xmlns:p14="http://schemas.microsoft.com/office/powerpoint/2010/main" val="3025545405"/>
       </p:ext>
     </p:extLst>
   </p:cSld>
@@ -6100,7 +6095,7 @@
           <a:p>
             <a:r>
               <a:rPr lang="en-US" dirty="0"/>
-              <a:t>Analyze Module</a:t>
+              <a:t>Conclusion</a:t>
             </a:r>
           </a:p>
         </p:txBody>
@@ -6120,164 +6115,11 @@
           <a:bodyPr/>
           <a:lstStyle/>
           <a:p>
-            <a:endParaRPr lang="en-US" dirty="0"/>
-          </a:p>
-        </p:txBody>
-      </p:sp>
-    </p:spTree>
-    <p:extLst>
-      <p:ext uri="{BB962C8B-B14F-4D97-AF65-F5344CB8AC3E}">
-        <p14:creationId xmlns:p14="http://schemas.microsoft.com/office/powerpoint/2010/main" val="3025545405"/>
-      </p:ext>
-    </p:extLst>
-  </p:cSld>
-  <p:clrMapOvr>
-    <a:masterClrMapping/>
-  </p:clrMapOvr>
-</p:sld>
-</file>
-
-<file path=ppt/slides/slide14.xml><?xml version="1.0" encoding="utf-8"?>
-<p:sld xmlns:a="http://schemas.openxmlformats.org/drawingml/2006/main" xmlns:r="http://schemas.openxmlformats.org/officeDocument/2006/relationships" xmlns:p="http://schemas.openxmlformats.org/presentationml/2006/main">
-  <p:cSld>
-    <p:spTree>
-      <p:nvGrpSpPr>
-        <p:cNvPr id="1" name=""/>
-        <p:cNvGrpSpPr/>
-        <p:nvPr/>
-      </p:nvGrpSpPr>
-      <p:grpSpPr>
-        <a:xfrm>
-          <a:off x="0" y="0"/>
-          <a:ext cx="0" cy="0"/>
-          <a:chOff x="0" y="0"/>
-          <a:chExt cx="0" cy="0"/>
-        </a:xfrm>
-      </p:grpSpPr>
-      <p:sp>
-        <p:nvSpPr>
-          <p:cNvPr id="2" name="Title 1"/>
-          <p:cNvSpPr>
-            <a:spLocks noGrp="1"/>
-          </p:cNvSpPr>
-          <p:nvPr>
-            <p:ph type="title"/>
-          </p:nvPr>
-        </p:nvSpPr>
-        <p:spPr/>
-        <p:txBody>
-          <a:bodyPr/>
-          <a:lstStyle/>
-          <a:p>
             <a:r>
               <a:rPr lang="en-US" dirty="0"/>
-              <a:t>Lint Module</a:t>
-            </a:r>
-          </a:p>
-        </p:txBody>
-      </p:sp>
-      <p:sp>
-        <p:nvSpPr>
-          <p:cNvPr id="3" name="Content Placeholder 2"/>
-          <p:cNvSpPr>
-            <a:spLocks noGrp="1"/>
-          </p:cNvSpPr>
-          <p:nvPr>
-            <p:ph idx="1"/>
-          </p:nvPr>
-        </p:nvSpPr>
-        <p:spPr/>
-        <p:txBody>
-          <a:bodyPr/>
-          <a:lstStyle/>
-          <a:p>
-            <a:r>
-              <a:rPr lang="en-US" dirty="0"/>
-              <a:t>???</a:t>
-            </a:r>
-          </a:p>
-          <a:p>
-            <a:r>
-              <a:rPr lang="en-US" dirty="0"/>
-              <a:t>To sum it up: Dr. P enforcing “no break statements &amp; </a:t>
-            </a:r>
-            <a:r>
-              <a:rPr lang="en-US" dirty="0" err="1"/>
-              <a:t>gotos</a:t>
-            </a:r>
-            <a:r>
-              <a:rPr lang="en-US" dirty="0"/>
-              <a:t>”</a:t>
-            </a:r>
-          </a:p>
-        </p:txBody>
-      </p:sp>
-    </p:spTree>
-    <p:extLst>
-      <p:ext uri="{BB962C8B-B14F-4D97-AF65-F5344CB8AC3E}">
-        <p14:creationId xmlns:p14="http://schemas.microsoft.com/office/powerpoint/2010/main" val="62995107"/>
-      </p:ext>
-    </p:extLst>
-  </p:cSld>
-  <p:clrMapOvr>
-    <a:masterClrMapping/>
-  </p:clrMapOvr>
-</p:sld>
-</file>
-
-<file path=ppt/slides/slide15.xml><?xml version="1.0" encoding="utf-8"?>
-<p:sld xmlns:a="http://schemas.openxmlformats.org/drawingml/2006/main" xmlns:r="http://schemas.openxmlformats.org/officeDocument/2006/relationships" xmlns:p="http://schemas.openxmlformats.org/presentationml/2006/main">
-  <p:cSld>
-    <p:spTree>
-      <p:nvGrpSpPr>
-        <p:cNvPr id="1" name=""/>
-        <p:cNvGrpSpPr/>
-        <p:nvPr/>
-      </p:nvGrpSpPr>
-      <p:grpSpPr>
-        <a:xfrm>
-          <a:off x="0" y="0"/>
-          <a:ext cx="0" cy="0"/>
-          <a:chOff x="0" y="0"/>
-          <a:chExt cx="0" cy="0"/>
-        </a:xfrm>
-      </p:grpSpPr>
-      <p:sp>
-        <p:nvSpPr>
-          <p:cNvPr id="2" name="Title 1"/>
-          <p:cNvSpPr>
-            <a:spLocks noGrp="1"/>
-          </p:cNvSpPr>
-          <p:nvPr>
-            <p:ph type="title"/>
-          </p:nvPr>
-        </p:nvSpPr>
-        <p:spPr/>
-        <p:txBody>
-          <a:bodyPr/>
-          <a:lstStyle/>
-          <a:p>
-            <a:r>
-              <a:rPr lang="en-US" dirty="0"/>
-              <a:t>Conclusion</a:t>
-            </a:r>
-          </a:p>
-        </p:txBody>
-      </p:sp>
-      <p:sp>
-        <p:nvSpPr>
-          <p:cNvPr id="3" name="Content Placeholder 2"/>
-          <p:cNvSpPr>
-            <a:spLocks noGrp="1"/>
-          </p:cNvSpPr>
-          <p:nvPr>
-            <p:ph idx="1"/>
-          </p:nvPr>
-        </p:nvSpPr>
-        <p:spPr/>
-        <p:txBody>
-          <a:bodyPr/>
-          <a:lstStyle/>
+              <a:t>Future implementations: Lint, VS implementation</a:t>
+            </a:r>
+          </a:p>
           <a:p>
             <a:r>
               <a:rPr lang="en-US" dirty="0"/>
@@ -6293,11 +6135,13 @@
           <a:p>
             <a:r>
               <a:rPr lang="en-US" dirty="0"/>
-              <a:t>Make sure to make time for </a:t>
-            </a:r>
-            <a:r>
-              <a:rPr lang="en-US"/>
-              <a:t>a demo</a:t>
+              <a:t>Make sure to make time for a demo</a:t>
+            </a:r>
+          </a:p>
+          <a:p>
+            <a:r>
+              <a:rPr lang="en-US"/>
+              <a:t>Font size</a:t>
             </a:r>
             <a:endParaRPr lang="en-US" dirty="0"/>
           </a:p>
@@ -6555,7 +6399,7 @@
           <a:p>
             <a:r>
               <a:rPr lang="en-US" dirty="0"/>
-              <a:t>Core Goals</a:t>
+              <a:t>Motivation</a:t>
             </a:r>
           </a:p>
         </p:txBody>
@@ -6578,6 +6422,12 @@
             <a:r>
               <a:rPr lang="en-US" dirty="0"/>
               <a:t>Stuff about encapsulation, multiple programming languages, different environments, etc. Basically a bunch of B.S. to make us look like we actually belong graduating from post-secondary education</a:t>
+            </a:r>
+          </a:p>
+          <a:p>
+            <a:r>
+              <a:rPr lang="en-US" dirty="0"/>
+              <a:t>To ease strain on programmer to learn language, understand a code, and </a:t>
             </a:r>
           </a:p>
         </p:txBody>
@@ -6629,7 +6479,7 @@
           <a:p>
             <a:r>
               <a:rPr lang="en-US" dirty="0"/>
-              <a:t>Project Goals</a:t>
+              <a:t>Project Example</a:t>
             </a:r>
           </a:p>
         </p:txBody>
@@ -6651,19 +6501,7 @@
           <a:p>
             <a:r>
               <a:rPr lang="en-US" dirty="0"/>
-              <a:t>Stuffs about each module</a:t>
-            </a:r>
-          </a:p>
-          <a:p>
-            <a:r>
-              <a:rPr lang="en-US" dirty="0"/>
-              <a:t>Standalone app</a:t>
-            </a:r>
-          </a:p>
-          <a:p>
-            <a:r>
-              <a:rPr lang="en-US" dirty="0"/>
-              <a:t>Visual studio implementation</a:t>
+              <a:t>Graph &amp; simple example</a:t>
             </a:r>
           </a:p>
         </p:txBody>
@@ -6859,14 +6697,12 @@
         </p:nvSpPr>
         <p:spPr/>
         <p:txBody>
-          <a:bodyPr>
-            <a:normAutofit/>
-          </a:bodyPr>
+          <a:bodyPr/>
           <a:lstStyle/>
           <a:p>
             <a:r>
               <a:rPr lang="en-US" dirty="0"/>
-              <a:t>Visual Studio Implementation: Specifications</a:t>
+              <a:t>Targeted Modules: Specifications</a:t>
             </a:r>
           </a:p>
         </p:txBody>
@@ -6888,15 +6724,42 @@
           <a:p>
             <a:r>
               <a:rPr lang="en-US" dirty="0"/>
-              <a:t>???</a:t>
-            </a:r>
+              <a:t>Control Module</a:t>
+            </a:r>
+          </a:p>
+          <a:p>
+            <a:r>
+              <a:rPr lang="en-US" dirty="0"/>
+              <a:t>Outline Module</a:t>
+            </a:r>
+          </a:p>
+          <a:p>
+            <a:r>
+              <a:rPr lang="en-US" dirty="0"/>
+              <a:t>Translate Module</a:t>
+            </a:r>
+          </a:p>
+          <a:p>
+            <a:r>
+              <a:rPr lang="en-US" dirty="0"/>
+              <a:t>Analyze Module</a:t>
+            </a:r>
+          </a:p>
+          <a:p>
+            <a:r>
+              <a:rPr lang="en-US" dirty="0"/>
+              <a:t>Lint Module</a:t>
+            </a:r>
+          </a:p>
+          <a:p>
+            <a:endParaRPr lang="en-US" dirty="0"/>
           </a:p>
         </p:txBody>
       </p:sp>
     </p:spTree>
     <p:extLst>
       <p:ext uri="{BB962C8B-B14F-4D97-AF65-F5344CB8AC3E}">
-        <p14:creationId xmlns:p14="http://schemas.microsoft.com/office/powerpoint/2010/main" val="1153685828"/>
+        <p14:creationId xmlns:p14="http://schemas.microsoft.com/office/powerpoint/2010/main" val="1766270442"/>
       </p:ext>
     </p:extLst>
   </p:cSld>
@@ -6940,7 +6803,7 @@
           <a:p>
             <a:r>
               <a:rPr lang="en-US" dirty="0"/>
-              <a:t>Targeted Modules: Specifications</a:t>
+              <a:t>Control Module</a:t>
             </a:r>
           </a:p>
         </p:txBody>
@@ -6962,42 +6825,21 @@
           <a:p>
             <a:r>
               <a:rPr lang="en-US" dirty="0"/>
-              <a:t>Control Module</a:t>
+              <a:t>How important this one is!</a:t>
             </a:r>
           </a:p>
           <a:p>
             <a:r>
               <a:rPr lang="en-US" dirty="0"/>
-              <a:t>Outline Module</a:t>
-            </a:r>
-          </a:p>
-          <a:p>
-            <a:r>
-              <a:rPr lang="en-US" dirty="0"/>
-              <a:t>Translate Module</a:t>
-            </a:r>
-          </a:p>
-          <a:p>
-            <a:r>
-              <a:rPr lang="en-US" dirty="0"/>
-              <a:t>Analyze Module</a:t>
-            </a:r>
-          </a:p>
-          <a:p>
-            <a:r>
-              <a:rPr lang="en-US" dirty="0"/>
-              <a:t>Lint Module</a:t>
-            </a:r>
-          </a:p>
-          <a:p>
-            <a:endParaRPr lang="en-US" dirty="0"/>
+              <a:t>The only module necessary to program operation (not program computation, though!)</a:t>
+            </a:r>
           </a:p>
         </p:txBody>
       </p:sp>
     </p:spTree>
     <p:extLst>
       <p:ext uri="{BB962C8B-B14F-4D97-AF65-F5344CB8AC3E}">
-        <p14:creationId xmlns:p14="http://schemas.microsoft.com/office/powerpoint/2010/main" val="1766270442"/>
+        <p14:creationId xmlns:p14="http://schemas.microsoft.com/office/powerpoint/2010/main" val="3648450403"/>
       </p:ext>
     </p:extLst>
   </p:cSld>

</xml_diff>